<commit_message>
added superPAC hash map example, updated twitter API example
</commit_message>
<xml_diff>
--- a/processing_data.pptx
+++ b/processing_data.pptx
@@ -4048,11 +4048,6 @@
               </a:rPr>
               <a:t>Visualizing Data with Processing</a:t>
             </a:r>
-            <a:endParaRPr lang="en-US" sz="3200" b="1" dirty="0" smtClean="0">
-              <a:solidFill>
-                <a:schemeClr val="bg1"/>
-              </a:solidFill>
-            </a:endParaRPr>
           </a:p>
           <a:p>
             <a:r>
@@ -4077,15 +4072,7 @@
                   <a:schemeClr val="bg1"/>
                 </a:solidFill>
               </a:rPr>
-              <a:t>, </a:t>
-            </a:r>
-            <a:r>
-              <a:rPr lang="en-US" sz="1600" dirty="0" smtClean="0">
-                <a:solidFill>
-                  <a:schemeClr val="bg1"/>
-                </a:solidFill>
-              </a:rPr>
-              <a:t>2013</a:t>
+              <a:t>, 2013</a:t>
             </a:r>
             <a:endParaRPr lang="en-US" sz="1600" dirty="0">
               <a:solidFill>
@@ -4189,7 +4176,7 @@
         <p:spPr>
           <a:xfrm>
             <a:off x="846597" y="3986917"/>
-            <a:ext cx="6853158" cy="584776"/>
+            <a:ext cx="7284566" cy="584776"/>
           </a:xfrm>
           <a:prstGeom prst="rect">
             <a:avLst/>
@@ -4204,18 +4191,22 @@
           <a:p>
             <a:r>
               <a:rPr lang="en-US" sz="3200" b="1" dirty="0" err="1" smtClean="0"/>
-              <a:t>itp.nyu.edu</a:t>
+              <a:t>github.com</a:t>
             </a:r>
             <a:r>
               <a:rPr lang="en-US" sz="3200" b="1" dirty="0"/>
-              <a:t>/residents</a:t>
-            </a:r>
-            <a:r>
-              <a:rPr lang="en-US" sz="3200" b="1" dirty="0" smtClean="0"/>
               <a:t>/</a:t>
             </a:r>
             <a:r>
-              <a:rPr lang="en-US" sz="3200" b="1" dirty="0" err="1" smtClean="0"/>
+              <a:rPr lang="en-US" sz="3200" b="1" dirty="0" err="1"/>
+              <a:t>itpresidents</a:t>
+            </a:r>
+            <a:r>
+              <a:rPr lang="en-US" sz="3200" b="1" dirty="0"/>
+              <a:t>/</a:t>
+            </a:r>
+            <a:r>
+              <a:rPr lang="en-US" sz="3200" b="1" dirty="0" err="1"/>
               <a:t>data_processing</a:t>
             </a:r>
             <a:endParaRPr lang="en-US" sz="1600" dirty="0"/>
@@ -4441,10 +4432,6 @@
               </a:rPr>
               <a:t>TSV – Tab Separated Values</a:t>
             </a:r>
-            <a:endParaRPr lang="en-US" b="1" dirty="0" smtClean="0">
-              <a:latin typeface="Helvetica"/>
-              <a:cs typeface="Helvetica"/>
-            </a:endParaRPr>
           </a:p>
           <a:p>
             <a:pPr>
@@ -4662,10 +4649,6 @@
               </a:rPr>
               <a:t>Clean up your data!</a:t>
             </a:r>
-            <a:endParaRPr lang="en-US" sz="4800" dirty="0" smtClean="0">
-              <a:latin typeface="Helvetica Light"/>
-              <a:cs typeface="Helvetica Light"/>
-            </a:endParaRPr>
           </a:p>
         </p:txBody>
       </p:sp>
@@ -5189,10 +5172,6 @@
               </a:rPr>
               <a:t>happens.</a:t>
             </a:r>
-            <a:endParaRPr lang="en-US" dirty="0" smtClean="0">
-              <a:latin typeface="Helvetica"/>
-              <a:cs typeface="Helvetica"/>
-            </a:endParaRPr>
           </a:p>
         </p:txBody>
       </p:sp>
@@ -6173,10 +6152,6 @@
               </a:rPr>
               <a:t>SVG Import and Manipulation</a:t>
             </a:r>
-            <a:endParaRPr lang="en-US" b="1" dirty="0" smtClean="0">
-              <a:latin typeface="Helvetica"/>
-              <a:cs typeface="Helvetica"/>
-            </a:endParaRPr>
           </a:p>
         </p:txBody>
       </p:sp>

</xml_diff>

<commit_message>
removed keys from twitter
</commit_message>
<xml_diff>
--- a/processing_data.pptx
+++ b/processing_data.pptx
@@ -199,7 +199,7 @@
           <a:p>
             <a:fld id="{68B82BDD-83C0-064A-BED6-633698D2CAF1}" type="datetimeFigureOut">
               <a:rPr lang="en-US" smtClean="0"/>
-              <a:t>11/20/13</a:t>
+              <a:t>11/21/13</a:t>
             </a:fld>
             <a:endParaRPr lang="en-US"/>
           </a:p>
@@ -1163,7 +1163,7 @@
           <a:p>
             <a:fld id="{1BE27C32-D025-BB46-8684-6E2AE7703617}" type="datetimeFigureOut">
               <a:rPr lang="en-US" smtClean="0"/>
-              <a:t>11/20/13</a:t>
+              <a:t>11/21/13</a:t>
             </a:fld>
             <a:endParaRPr lang="en-US"/>
           </a:p>
@@ -1333,7 +1333,7 @@
           <a:p>
             <a:fld id="{1BE27C32-D025-BB46-8684-6E2AE7703617}" type="datetimeFigureOut">
               <a:rPr lang="en-US" smtClean="0"/>
-              <a:t>11/20/13</a:t>
+              <a:t>11/21/13</a:t>
             </a:fld>
             <a:endParaRPr lang="en-US"/>
           </a:p>
@@ -1513,7 +1513,7 @@
           <a:p>
             <a:fld id="{1BE27C32-D025-BB46-8684-6E2AE7703617}" type="datetimeFigureOut">
               <a:rPr lang="en-US" smtClean="0"/>
-              <a:t>11/20/13</a:t>
+              <a:t>11/21/13</a:t>
             </a:fld>
             <a:endParaRPr lang="en-US"/>
           </a:p>
@@ -1683,7 +1683,7 @@
           <a:p>
             <a:fld id="{1BE27C32-D025-BB46-8684-6E2AE7703617}" type="datetimeFigureOut">
               <a:rPr lang="en-US" smtClean="0"/>
-              <a:t>11/20/13</a:t>
+              <a:t>11/21/13</a:t>
             </a:fld>
             <a:endParaRPr lang="en-US"/>
           </a:p>
@@ -1929,7 +1929,7 @@
           <a:p>
             <a:fld id="{1BE27C32-D025-BB46-8684-6E2AE7703617}" type="datetimeFigureOut">
               <a:rPr lang="en-US" smtClean="0"/>
-              <a:t>11/20/13</a:t>
+              <a:t>11/21/13</a:t>
             </a:fld>
             <a:endParaRPr lang="en-US"/>
           </a:p>
@@ -2217,7 +2217,7 @@
           <a:p>
             <a:fld id="{1BE27C32-D025-BB46-8684-6E2AE7703617}" type="datetimeFigureOut">
               <a:rPr lang="en-US" smtClean="0"/>
-              <a:t>11/20/13</a:t>
+              <a:t>11/21/13</a:t>
             </a:fld>
             <a:endParaRPr lang="en-US"/>
           </a:p>
@@ -2639,7 +2639,7 @@
           <a:p>
             <a:fld id="{1BE27C32-D025-BB46-8684-6E2AE7703617}" type="datetimeFigureOut">
               <a:rPr lang="en-US" smtClean="0"/>
-              <a:t>11/20/13</a:t>
+              <a:t>11/21/13</a:t>
             </a:fld>
             <a:endParaRPr lang="en-US"/>
           </a:p>
@@ -2757,7 +2757,7 @@
           <a:p>
             <a:fld id="{1BE27C32-D025-BB46-8684-6E2AE7703617}" type="datetimeFigureOut">
               <a:rPr lang="en-US" smtClean="0"/>
-              <a:t>11/20/13</a:t>
+              <a:t>11/21/13</a:t>
             </a:fld>
             <a:endParaRPr lang="en-US"/>
           </a:p>
@@ -2852,7 +2852,7 @@
           <a:p>
             <a:fld id="{1BE27C32-D025-BB46-8684-6E2AE7703617}" type="datetimeFigureOut">
               <a:rPr lang="en-US" smtClean="0"/>
-              <a:t>11/20/13</a:t>
+              <a:t>11/21/13</a:t>
             </a:fld>
             <a:endParaRPr lang="en-US"/>
           </a:p>
@@ -3129,7 +3129,7 @@
           <a:p>
             <a:fld id="{1BE27C32-D025-BB46-8684-6E2AE7703617}" type="datetimeFigureOut">
               <a:rPr lang="en-US" smtClean="0"/>
-              <a:t>11/20/13</a:t>
+              <a:t>11/21/13</a:t>
             </a:fld>
             <a:endParaRPr lang="en-US"/>
           </a:p>
@@ -3382,7 +3382,7 @@
           <a:p>
             <a:fld id="{1BE27C32-D025-BB46-8684-6E2AE7703617}" type="datetimeFigureOut">
               <a:rPr lang="en-US" smtClean="0"/>
-              <a:t>11/20/13</a:t>
+              <a:t>11/21/13</a:t>
             </a:fld>
             <a:endParaRPr lang="en-US"/>
           </a:p>
@@ -3595,7 +3595,7 @@
           <a:p>
             <a:fld id="{1BE27C32-D025-BB46-8684-6E2AE7703617}" type="datetimeFigureOut">
               <a:rPr lang="en-US" smtClean="0"/>
-              <a:t>11/20/13</a:t>
+              <a:t>11/21/13</a:t>
             </a:fld>
             <a:endParaRPr lang="en-US"/>
           </a:p>
@@ -6053,7 +6053,7 @@
         <p:spPr>
           <a:xfrm>
             <a:off x="376263" y="1343667"/>
-            <a:ext cx="4005237" cy="2146742"/>
+            <a:ext cx="4005237" cy="2562240"/>
           </a:xfrm>
           <a:prstGeom prst="rect">
             <a:avLst/>
@@ -6105,6 +6105,24 @@
                 <a:cs typeface="Helvetica"/>
               </a:rPr>
               <a:t>Hashmaps</a:t>
+            </a:r>
+            <a:endParaRPr lang="en-US" b="1" dirty="0" smtClean="0">
+              <a:latin typeface="Helvetica"/>
+              <a:cs typeface="Helvetica"/>
+            </a:endParaRPr>
+          </a:p>
+          <a:p>
+            <a:pPr>
+              <a:lnSpc>
+                <a:spcPct val="150000"/>
+              </a:lnSpc>
+            </a:pPr>
+            <a:r>
+              <a:rPr lang="en-US" b="1" dirty="0" smtClean="0">
+                <a:latin typeface="Helvetica"/>
+                <a:cs typeface="Helvetica"/>
+              </a:rPr>
+              <a:t>Mapping</a:t>
             </a:r>
             <a:endParaRPr lang="en-US" b="1" dirty="0" smtClean="0">
               <a:latin typeface="Helvetica"/>

</xml_diff>